<commit_message>
Harrer Text und Präsentation
</commit_message>
<xml_diff>
--- a/Diplomarbeit/Powerpoint/Harrer.pptx
+++ b/Diplomarbeit/Powerpoint/Harrer.pptx
@@ -308,7 +308,7 @@
             <a:fld id="{B61BEF0D-F0BB-DE4B-95CE-6DB70DBA9567}" type="datetimeFigureOut">
               <a:rPr lang="en-US" dirty="0"/>
               <a:pPr/>
-              <a:t>5/24/2018</a:t>
+              <a:t>5/25/2018</a:t>
             </a:fld>
             <a:endParaRPr lang="en-US" dirty="0"/>
           </a:p>
@@ -643,7 +643,7 @@
             <a:fld id="{B61BEF0D-F0BB-DE4B-95CE-6DB70DBA9567}" type="datetimeFigureOut">
               <a:rPr lang="en-US" dirty="0"/>
               <a:pPr/>
-              <a:t>5/24/2018</a:t>
+              <a:t>5/25/2018</a:t>
             </a:fld>
             <a:endParaRPr lang="en-US" dirty="0"/>
           </a:p>
@@ -1041,7 +1041,7 @@
             <a:fld id="{B61BEF0D-F0BB-DE4B-95CE-6DB70DBA9567}" type="datetimeFigureOut">
               <a:rPr lang="en-US" dirty="0"/>
               <a:pPr/>
-              <a:t>5/24/2018</a:t>
+              <a:t>5/25/2018</a:t>
             </a:fld>
             <a:endParaRPr lang="en-US" dirty="0"/>
           </a:p>
@@ -1374,7 +1374,7 @@
             <a:fld id="{B61BEF0D-F0BB-DE4B-95CE-6DB70DBA9567}" type="datetimeFigureOut">
               <a:rPr lang="en-US" dirty="0"/>
               <a:pPr/>
-              <a:t>5/24/2018</a:t>
+              <a:t>5/25/2018</a:t>
             </a:fld>
             <a:endParaRPr lang="en-US" dirty="0"/>
           </a:p>
@@ -1691,7 +1691,7 @@
             <a:fld id="{B61BEF0D-F0BB-DE4B-95CE-6DB70DBA9567}" type="datetimeFigureOut">
               <a:rPr lang="en-US" dirty="0"/>
               <a:pPr/>
-              <a:t>5/24/2018</a:t>
+              <a:t>5/25/2018</a:t>
             </a:fld>
             <a:endParaRPr lang="en-US" dirty="0"/>
           </a:p>
@@ -2084,7 +2084,7 @@
             <a:fld id="{B61BEF0D-F0BB-DE4B-95CE-6DB70DBA9567}" type="datetimeFigureOut">
               <a:rPr lang="en-US" dirty="0"/>
               <a:pPr/>
-              <a:t>5/24/2018</a:t>
+              <a:t>5/25/2018</a:t>
             </a:fld>
             <a:endParaRPr lang="en-US" dirty="0"/>
           </a:p>
@@ -2338,7 +2338,7 @@
             <a:fld id="{B61BEF0D-F0BB-DE4B-95CE-6DB70DBA9567}" type="datetimeFigureOut">
               <a:rPr lang="en-US" dirty="0"/>
               <a:pPr/>
-              <a:t>5/24/2018</a:t>
+              <a:t>5/25/2018</a:t>
             </a:fld>
             <a:endParaRPr lang="en-US" dirty="0"/>
           </a:p>
@@ -2597,7 +2597,7 @@
             <a:fld id="{B61BEF0D-F0BB-DE4B-95CE-6DB70DBA9567}" type="datetimeFigureOut">
               <a:rPr lang="en-US" dirty="0"/>
               <a:pPr/>
-              <a:t>5/24/2018</a:t>
+              <a:t>5/25/2018</a:t>
             </a:fld>
             <a:endParaRPr lang="en-US" dirty="0"/>
           </a:p>
@@ -2856,7 +2856,7 @@
             <a:fld id="{B61BEF0D-F0BB-DE4B-95CE-6DB70DBA9567}" type="datetimeFigureOut">
               <a:rPr lang="en-US" dirty="0"/>
               <a:pPr/>
-              <a:t>5/24/2018</a:t>
+              <a:t>5/25/2018</a:t>
             </a:fld>
             <a:endParaRPr lang="en-US" dirty="0"/>
           </a:p>
@@ -3182,7 +3182,7 @@
             <a:fld id="{B61BEF0D-F0BB-DE4B-95CE-6DB70DBA9567}" type="datetimeFigureOut">
               <a:rPr lang="en-US" dirty="0"/>
               <a:pPr/>
-              <a:t>5/24/2018</a:t>
+              <a:t>5/25/2018</a:t>
             </a:fld>
             <a:endParaRPr lang="en-US" dirty="0"/>
           </a:p>
@@ -3502,7 +3502,7 @@
             <a:fld id="{B61BEF0D-F0BB-DE4B-95CE-6DB70DBA9567}" type="datetimeFigureOut">
               <a:rPr lang="en-US" dirty="0"/>
               <a:pPr/>
-              <a:t>5/24/2018</a:t>
+              <a:t>5/25/2018</a:t>
             </a:fld>
             <a:endParaRPr lang="en-US" dirty="0"/>
           </a:p>
@@ -3956,7 +3956,7 @@
             <a:fld id="{B61BEF0D-F0BB-DE4B-95CE-6DB70DBA9567}" type="datetimeFigureOut">
               <a:rPr lang="en-US" dirty="0"/>
               <a:pPr/>
-              <a:t>5/24/2018</a:t>
+              <a:t>5/25/2018</a:t>
             </a:fld>
             <a:endParaRPr lang="en-US" dirty="0"/>
           </a:p>
@@ -4158,7 +4158,7 @@
             <a:fld id="{B61BEF0D-F0BB-DE4B-95CE-6DB70DBA9567}" type="datetimeFigureOut">
               <a:rPr lang="en-US" dirty="0"/>
               <a:pPr/>
-              <a:t>5/24/2018</a:t>
+              <a:t>5/25/2018</a:t>
             </a:fld>
             <a:endParaRPr lang="en-US" dirty="0"/>
           </a:p>
@@ -4332,7 +4332,7 @@
             <a:fld id="{B61BEF0D-F0BB-DE4B-95CE-6DB70DBA9567}" type="datetimeFigureOut">
               <a:rPr lang="en-US" dirty="0"/>
               <a:pPr/>
-              <a:t>5/24/2018</a:t>
+              <a:t>5/25/2018</a:t>
             </a:fld>
             <a:endParaRPr lang="en-US" dirty="0"/>
           </a:p>
@@ -4662,7 +4662,7 @@
             <a:fld id="{B61BEF0D-F0BB-DE4B-95CE-6DB70DBA9567}" type="datetimeFigureOut">
               <a:rPr lang="en-US" dirty="0"/>
               <a:pPr/>
-              <a:t>5/24/2018</a:t>
+              <a:t>5/25/2018</a:t>
             </a:fld>
             <a:endParaRPr lang="en-US" dirty="0"/>
           </a:p>
@@ -5004,7 +5004,7 @@
             <a:fld id="{B61BEF0D-F0BB-DE4B-95CE-6DB70DBA9567}" type="datetimeFigureOut">
               <a:rPr lang="en-US" dirty="0"/>
               <a:pPr/>
-              <a:t>5/24/2018</a:t>
+              <a:t>5/25/2018</a:t>
             </a:fld>
             <a:endParaRPr lang="en-US" dirty="0"/>
           </a:p>
@@ -7118,7 +7118,7 @@
             <a:fld id="{B61BEF0D-F0BB-DE4B-95CE-6DB70DBA9567}" type="datetimeFigureOut">
               <a:rPr lang="en-US" dirty="0"/>
               <a:pPr/>
-              <a:t>5/24/2018</a:t>
+              <a:t>5/25/2018</a:t>
             </a:fld>
             <a:endParaRPr lang="en-US" dirty="0"/>
           </a:p>
@@ -7649,11 +7649,13 @@
         </p:nvSpPr>
         <p:spPr/>
         <p:txBody>
-          <a:bodyPr/>
+          <a:bodyPr>
+            <a:normAutofit/>
+          </a:bodyPr>
           <a:lstStyle/>
           <a:p>
             <a:r>
-              <a:rPr lang="de-AT" dirty="0"/>
+              <a:rPr lang="de-AT" sz="6000" dirty="0"/>
               <a:t>Java-Programm</a:t>
             </a:r>
           </a:p>
@@ -7740,11 +7742,13 @@
         </p:nvSpPr>
         <p:spPr/>
         <p:txBody>
-          <a:bodyPr/>
+          <a:bodyPr>
+            <a:normAutofit/>
+          </a:bodyPr>
           <a:lstStyle/>
           <a:p>
             <a:r>
-              <a:rPr lang="de-AT" dirty="0"/>
+              <a:rPr lang="de-AT" sz="4000" dirty="0"/>
               <a:t>Java-Programm Agenda	</a:t>
             </a:r>
           </a:p>
@@ -7768,11 +7772,13 @@
         </p:nvSpPr>
         <p:spPr/>
         <p:txBody>
-          <a:bodyPr/>
+          <a:bodyPr>
+            <a:normAutofit/>
+          </a:bodyPr>
           <a:lstStyle/>
           <a:p>
             <a:r>
-              <a:rPr lang="de-AT" dirty="0"/>
+              <a:rPr lang="de-AT" sz="2000" dirty="0"/>
               <a:t>Vorstellung von</a:t>
             </a:r>
           </a:p>
@@ -7782,7 +7788,7 @@
               <a:buChar char="•"/>
             </a:pPr>
             <a:r>
-              <a:rPr lang="de-AT" dirty="0"/>
+              <a:rPr lang="de-AT" sz="1800" dirty="0"/>
               <a:t>Grundidee</a:t>
             </a:r>
           </a:p>
@@ -7792,7 +7798,7 @@
               <a:buChar char="•"/>
             </a:pPr>
             <a:r>
-              <a:rPr lang="de-AT" dirty="0"/>
+              <a:rPr lang="de-AT" sz="1800" dirty="0"/>
               <a:t>Ziele</a:t>
             </a:r>
           </a:p>
@@ -7802,7 +7808,7 @@
               <a:buChar char="•"/>
             </a:pPr>
             <a:r>
-              <a:rPr lang="de-AT" dirty="0"/>
+              <a:rPr lang="de-AT" sz="1800" dirty="0"/>
               <a:t>Probleme</a:t>
             </a:r>
           </a:p>
@@ -7812,20 +7818,19 @@
               <a:buChar char="•"/>
             </a:pPr>
             <a:r>
-              <a:rPr lang="de-AT" dirty="0" err="1"/>
-              <a:t>Resumee</a:t>
-            </a:r>
-            <a:endParaRPr lang="de-AT" dirty="0"/>
+              <a:rPr lang="de-AT" sz="1800" dirty="0"/>
+              <a:t>Resümee</a:t>
+            </a:r>
           </a:p>
           <a:p>
             <a:pPr marL="457200" lvl="1" indent="0">
               <a:buNone/>
             </a:pPr>
-            <a:endParaRPr lang="de-AT" dirty="0"/>
-          </a:p>
-          <a:p>
-            <a:r>
-              <a:rPr lang="de-AT" dirty="0"/>
+            <a:endParaRPr lang="de-AT" sz="1800" dirty="0"/>
+          </a:p>
+          <a:p>
+            <a:r>
+              <a:rPr lang="de-AT" sz="2000" dirty="0"/>
               <a:t>Verteidigung </a:t>
             </a:r>
           </a:p>
@@ -7879,7 +7884,9 @@
         </p:nvSpPr>
         <p:spPr/>
         <p:txBody>
-          <a:bodyPr/>
+          <a:bodyPr>
+            <a:normAutofit/>
+          </a:bodyPr>
           <a:lstStyle/>
           <a:p>
             <a:r>
@@ -7911,34 +7918,34 @@
           <a:lstStyle/>
           <a:p>
             <a:r>
-              <a:rPr lang="de-AT" dirty="0"/>
+              <a:rPr lang="de-AT" sz="2000" dirty="0"/>
               <a:t>Benutzerfreundlich</a:t>
             </a:r>
           </a:p>
           <a:p>
             <a:pPr lvl="1"/>
             <a:r>
-              <a:rPr lang="de-AT" dirty="0"/>
+              <a:rPr lang="de-AT" sz="1800" dirty="0"/>
               <a:t>Übersichtlich</a:t>
             </a:r>
           </a:p>
           <a:p>
             <a:pPr lvl="1"/>
             <a:r>
-              <a:rPr lang="de-AT" dirty="0"/>
+              <a:rPr lang="de-AT" sz="1800" dirty="0"/>
               <a:t>Sinnvoll benannte Menüpunkte</a:t>
             </a:r>
           </a:p>
           <a:p>
             <a:pPr lvl="1"/>
             <a:r>
-              <a:rPr lang="de-AT" dirty="0"/>
+              <a:rPr lang="de-AT" sz="1800" dirty="0"/>
               <a:t>Soll ohne Anleitung bedienbar sein</a:t>
             </a:r>
           </a:p>
           <a:p>
             <a:r>
-              <a:rPr lang="de-AT" dirty="0"/>
+              <a:rPr lang="de-AT" sz="2000" dirty="0"/>
               <a:t>Wichtige Informationen sollen sofort ersichtlich sein</a:t>
             </a:r>
           </a:p>
@@ -8036,29 +8043,32 @@
           <a:lstStyle/>
           <a:p>
             <a:r>
-              <a:rPr lang="de-AT" dirty="0"/>
+              <a:rPr lang="de-AT" sz="2000" dirty="0"/>
               <a:t>Fütterungszeiten verwalten</a:t>
             </a:r>
           </a:p>
           <a:p>
             <a:r>
-              <a:rPr lang="de-AT" dirty="0"/>
-              <a:t>Steuerung der Motoren und Sensoren</a:t>
-            </a:r>
-          </a:p>
-          <a:p>
-            <a:r>
-              <a:rPr lang="de-AT" dirty="0"/>
+              <a:rPr lang="de-AT" sz="2000" dirty="0"/>
+              <a:t>Steuerung der Motoren und Auswerten der Sensoren</a:t>
+            </a:r>
+          </a:p>
+          <a:p>
+            <a:r>
+              <a:rPr lang="de-AT" sz="2000" dirty="0"/>
               <a:t>Benutzer muss anlegbar sein</a:t>
             </a:r>
           </a:p>
           <a:p>
             <a:r>
-              <a:rPr lang="de-AT" dirty="0"/>
+              <a:rPr lang="de-AT" sz="2000" dirty="0"/>
               <a:t>Kommunikation mit der Web-Applikation</a:t>
             </a:r>
           </a:p>
           <a:p>
+            <a:pPr marL="0" indent="0">
+              <a:buNone/>
+            </a:pPr>
             <a:endParaRPr lang="de-AT" dirty="0"/>
           </a:p>
         </p:txBody>
@@ -8143,25 +8153,21 @@
           <a:lstStyle/>
           <a:p>
             <a:r>
-              <a:rPr lang="de-AT" dirty="0" err="1"/>
-              <a:t>Kombatibilität</a:t>
-            </a:r>
-            <a:r>
-              <a:rPr lang="de-AT" dirty="0"/>
-              <a:t> zwischen Datenbank und Raspberry-Betriebssystem</a:t>
-            </a:r>
-          </a:p>
-          <a:p>
-            <a:r>
-              <a:rPr lang="de-AT" dirty="0"/>
+              <a:rPr lang="de-AT" sz="2000" dirty="0"/>
+              <a:t>Kompatibilität zwischen Datenbank und Raspberry-Betriebssystem</a:t>
+            </a:r>
+          </a:p>
+          <a:p>
+            <a:r>
+              <a:rPr lang="de-AT" sz="2000" dirty="0"/>
               <a:t>Erkennungsproblem der Pins mit pi4j</a:t>
             </a:r>
           </a:p>
           <a:p>
-            <a:r>
-              <a:rPr lang="de-AT" dirty="0"/>
-              <a:t> </a:t>
-            </a:r>
+            <a:pPr marL="0" indent="0">
+              <a:buNone/>
+            </a:pPr>
+            <a:endParaRPr lang="de-AT" dirty="0"/>
           </a:p>
         </p:txBody>
       </p:sp>
@@ -8241,23 +8247,25 @@
         </p:nvSpPr>
         <p:spPr/>
         <p:txBody>
-          <a:bodyPr/>
+          <a:bodyPr>
+            <a:normAutofit/>
+          </a:bodyPr>
           <a:lstStyle/>
           <a:p>
             <a:r>
-              <a:rPr lang="de-AT" dirty="0"/>
+              <a:rPr lang="de-AT" sz="2000" dirty="0"/>
               <a:t>Optimierung der grafischen Oberfläche</a:t>
             </a:r>
           </a:p>
           <a:p>
             <a:r>
-              <a:rPr lang="de-AT" dirty="0"/>
+              <a:rPr lang="de-AT" sz="2000" dirty="0"/>
               <a:t>Anlegen von mehreren Benutzern</a:t>
             </a:r>
           </a:p>
           <a:p>
             <a:r>
-              <a:rPr lang="de-AT" dirty="0"/>
+              <a:rPr lang="de-AT" sz="2000" dirty="0"/>
               <a:t>Erstellen von Vorlagen mit festgelegten Zeiten</a:t>
             </a:r>
           </a:p>

</xml_diff>

<commit_message>
Harrer Text und Powerpoint
</commit_message>
<xml_diff>
--- a/Diplomarbeit/Powerpoint/Harrer.pptx
+++ b/Diplomarbeit/Powerpoint/Harrer.pptx
@@ -310,7 +310,7 @@
             <a:fld id="{B61BEF0D-F0BB-DE4B-95CE-6DB70DBA9567}" type="datetimeFigureOut">
               <a:rPr lang="en-US" dirty="0"/>
               <a:pPr/>
-              <a:t>5/26/2018</a:t>
+              <a:t>5/27/2018</a:t>
             </a:fld>
             <a:endParaRPr lang="en-US" dirty="0"/>
           </a:p>
@@ -645,7 +645,7 @@
             <a:fld id="{B61BEF0D-F0BB-DE4B-95CE-6DB70DBA9567}" type="datetimeFigureOut">
               <a:rPr lang="en-US" dirty="0"/>
               <a:pPr/>
-              <a:t>5/26/2018</a:t>
+              <a:t>5/27/2018</a:t>
             </a:fld>
             <a:endParaRPr lang="en-US" dirty="0"/>
           </a:p>
@@ -1043,7 +1043,7 @@
             <a:fld id="{B61BEF0D-F0BB-DE4B-95CE-6DB70DBA9567}" type="datetimeFigureOut">
               <a:rPr lang="en-US" dirty="0"/>
               <a:pPr/>
-              <a:t>5/26/2018</a:t>
+              <a:t>5/27/2018</a:t>
             </a:fld>
             <a:endParaRPr lang="en-US" dirty="0"/>
           </a:p>
@@ -1376,7 +1376,7 @@
             <a:fld id="{B61BEF0D-F0BB-DE4B-95CE-6DB70DBA9567}" type="datetimeFigureOut">
               <a:rPr lang="en-US" dirty="0"/>
               <a:pPr/>
-              <a:t>5/26/2018</a:t>
+              <a:t>5/27/2018</a:t>
             </a:fld>
             <a:endParaRPr lang="en-US" dirty="0"/>
           </a:p>
@@ -1693,7 +1693,7 @@
             <a:fld id="{B61BEF0D-F0BB-DE4B-95CE-6DB70DBA9567}" type="datetimeFigureOut">
               <a:rPr lang="en-US" dirty="0"/>
               <a:pPr/>
-              <a:t>5/26/2018</a:t>
+              <a:t>5/27/2018</a:t>
             </a:fld>
             <a:endParaRPr lang="en-US" dirty="0"/>
           </a:p>
@@ -2086,7 +2086,7 @@
             <a:fld id="{B61BEF0D-F0BB-DE4B-95CE-6DB70DBA9567}" type="datetimeFigureOut">
               <a:rPr lang="en-US" dirty="0"/>
               <a:pPr/>
-              <a:t>5/26/2018</a:t>
+              <a:t>5/27/2018</a:t>
             </a:fld>
             <a:endParaRPr lang="en-US" dirty="0"/>
           </a:p>
@@ -2340,7 +2340,7 @@
             <a:fld id="{B61BEF0D-F0BB-DE4B-95CE-6DB70DBA9567}" type="datetimeFigureOut">
               <a:rPr lang="en-US" dirty="0"/>
               <a:pPr/>
-              <a:t>5/26/2018</a:t>
+              <a:t>5/27/2018</a:t>
             </a:fld>
             <a:endParaRPr lang="en-US" dirty="0"/>
           </a:p>
@@ -2599,7 +2599,7 @@
             <a:fld id="{B61BEF0D-F0BB-DE4B-95CE-6DB70DBA9567}" type="datetimeFigureOut">
               <a:rPr lang="en-US" dirty="0"/>
               <a:pPr/>
-              <a:t>5/26/2018</a:t>
+              <a:t>5/27/2018</a:t>
             </a:fld>
             <a:endParaRPr lang="en-US" dirty="0"/>
           </a:p>
@@ -2858,7 +2858,7 @@
             <a:fld id="{B61BEF0D-F0BB-DE4B-95CE-6DB70DBA9567}" type="datetimeFigureOut">
               <a:rPr lang="en-US" dirty="0"/>
               <a:pPr/>
-              <a:t>5/26/2018</a:t>
+              <a:t>5/27/2018</a:t>
             </a:fld>
             <a:endParaRPr lang="en-US" dirty="0"/>
           </a:p>
@@ -3184,7 +3184,7 @@
             <a:fld id="{B61BEF0D-F0BB-DE4B-95CE-6DB70DBA9567}" type="datetimeFigureOut">
               <a:rPr lang="en-US" dirty="0"/>
               <a:pPr/>
-              <a:t>5/26/2018</a:t>
+              <a:t>5/27/2018</a:t>
             </a:fld>
             <a:endParaRPr lang="en-US" dirty="0"/>
           </a:p>
@@ -3504,7 +3504,7 @@
             <a:fld id="{B61BEF0D-F0BB-DE4B-95CE-6DB70DBA9567}" type="datetimeFigureOut">
               <a:rPr lang="en-US" dirty="0"/>
               <a:pPr/>
-              <a:t>5/26/2018</a:t>
+              <a:t>5/27/2018</a:t>
             </a:fld>
             <a:endParaRPr lang="en-US" dirty="0"/>
           </a:p>
@@ -3958,7 +3958,7 @@
             <a:fld id="{B61BEF0D-F0BB-DE4B-95CE-6DB70DBA9567}" type="datetimeFigureOut">
               <a:rPr lang="en-US" dirty="0"/>
               <a:pPr/>
-              <a:t>5/26/2018</a:t>
+              <a:t>5/27/2018</a:t>
             </a:fld>
             <a:endParaRPr lang="en-US" dirty="0"/>
           </a:p>
@@ -4160,7 +4160,7 @@
             <a:fld id="{B61BEF0D-F0BB-DE4B-95CE-6DB70DBA9567}" type="datetimeFigureOut">
               <a:rPr lang="en-US" dirty="0"/>
               <a:pPr/>
-              <a:t>5/26/2018</a:t>
+              <a:t>5/27/2018</a:t>
             </a:fld>
             <a:endParaRPr lang="en-US" dirty="0"/>
           </a:p>
@@ -4334,7 +4334,7 @@
             <a:fld id="{B61BEF0D-F0BB-DE4B-95CE-6DB70DBA9567}" type="datetimeFigureOut">
               <a:rPr lang="en-US" dirty="0"/>
               <a:pPr/>
-              <a:t>5/26/2018</a:t>
+              <a:t>5/27/2018</a:t>
             </a:fld>
             <a:endParaRPr lang="en-US" dirty="0"/>
           </a:p>
@@ -4664,7 +4664,7 @@
             <a:fld id="{B61BEF0D-F0BB-DE4B-95CE-6DB70DBA9567}" type="datetimeFigureOut">
               <a:rPr lang="en-US" dirty="0"/>
               <a:pPr/>
-              <a:t>5/26/2018</a:t>
+              <a:t>5/27/2018</a:t>
             </a:fld>
             <a:endParaRPr lang="en-US" dirty="0"/>
           </a:p>
@@ -5006,7 +5006,7 @@
             <a:fld id="{B61BEF0D-F0BB-DE4B-95CE-6DB70DBA9567}" type="datetimeFigureOut">
               <a:rPr lang="en-US" dirty="0"/>
               <a:pPr/>
-              <a:t>5/26/2018</a:t>
+              <a:t>5/27/2018</a:t>
             </a:fld>
             <a:endParaRPr lang="en-US" dirty="0"/>
           </a:p>
@@ -7120,7 +7120,7 @@
             <a:fld id="{B61BEF0D-F0BB-DE4B-95CE-6DB70DBA9567}" type="datetimeFigureOut">
               <a:rPr lang="en-US" dirty="0"/>
               <a:pPr/>
-              <a:t>5/26/2018</a:t>
+              <a:t>5/27/2018</a:t>
             </a:fld>
             <a:endParaRPr lang="en-US" dirty="0"/>
           </a:p>
@@ -7857,16 +7857,6 @@
             </a:pPr>
             <a:r>
               <a:rPr lang="de-AT" sz="1800" dirty="0"/>
-              <a:t>Grundidee</a:t>
-            </a:r>
-          </a:p>
-          <a:p>
-            <a:pPr lvl="1">
-              <a:buFont typeface="Arial" panose="020B0604020202020204" pitchFamily="34" charset="0"/>
-              <a:buChar char="•"/>
-            </a:pPr>
-            <a:r>
-              <a:rPr lang="de-AT" sz="1800" dirty="0"/>
               <a:t>Ziele</a:t>
             </a:r>
           </a:p>

</xml_diff>